<commit_message>
ERD - new 1
a new ERD
</commit_message>
<xml_diff>
--- a/ERD.pptx
+++ b/ERD.pptx
@@ -104,6 +104,11 @@
       </a:defRPr>
     </a:lvl9pPr>
   </p:defaultTextStyle>
+  <p:extLst>
+    <p:ext uri="{EFAFB233-063F-42B5-8137-9DF3F51BA10A}">
+      <p15:sldGuideLst xmlns:p15="http://schemas.microsoft.com/office/powerpoint/2012/main"/>
+    </p:ext>
+  </p:extLst>
 </p:presentation>
 </file>
 
@@ -303,7 +308,7 @@
           <a:p>
             <a:fld id="{26496270-3B2A-4858-B8EB-16555E555E46}" type="datetimeFigureOut">
               <a:rPr lang="en-GB" smtClean="0"/>
-              <a:t>04/03/2019</a:t>
+              <a:t>11/03/2019</a:t>
             </a:fld>
             <a:endParaRPr lang="en-GB"/>
           </a:p>
@@ -524,7 +529,7 @@
           <a:p>
             <a:fld id="{26496270-3B2A-4858-B8EB-16555E555E46}" type="datetimeFigureOut">
               <a:rPr lang="en-GB" smtClean="0"/>
-              <a:t>04/03/2019</a:t>
+              <a:t>11/03/2019</a:t>
             </a:fld>
             <a:endParaRPr lang="en-GB"/>
           </a:p>
@@ -704,7 +709,7 @@
           <a:p>
             <a:fld id="{26496270-3B2A-4858-B8EB-16555E555E46}" type="datetimeFigureOut">
               <a:rPr lang="en-GB" smtClean="0"/>
-              <a:t>04/03/2019</a:t>
+              <a:t>11/03/2019</a:t>
             </a:fld>
             <a:endParaRPr lang="en-GB"/>
           </a:p>
@@ -874,7 +879,7 @@
           <a:p>
             <a:fld id="{26496270-3B2A-4858-B8EB-16555E555E46}" type="datetimeFigureOut">
               <a:rPr lang="en-GB" smtClean="0"/>
-              <a:t>04/03/2019</a:t>
+              <a:t>11/03/2019</a:t>
             </a:fld>
             <a:endParaRPr lang="en-GB"/>
           </a:p>
@@ -1125,7 +1130,7 @@
           <a:p>
             <a:fld id="{26496270-3B2A-4858-B8EB-16555E555E46}" type="datetimeFigureOut">
               <a:rPr lang="en-GB" smtClean="0"/>
-              <a:t>04/03/2019</a:t>
+              <a:t>11/03/2019</a:t>
             </a:fld>
             <a:endParaRPr lang="en-GB"/>
           </a:p>
@@ -1448,7 +1453,7 @@
           <a:p>
             <a:fld id="{26496270-3B2A-4858-B8EB-16555E555E46}" type="datetimeFigureOut">
               <a:rPr lang="en-GB" smtClean="0"/>
-              <a:t>04/03/2019</a:t>
+              <a:t>11/03/2019</a:t>
             </a:fld>
             <a:endParaRPr lang="en-GB"/>
           </a:p>
@@ -1872,7 +1877,7 @@
           <a:p>
             <a:fld id="{26496270-3B2A-4858-B8EB-16555E555E46}" type="datetimeFigureOut">
               <a:rPr lang="en-GB" smtClean="0"/>
-              <a:t>04/03/2019</a:t>
+              <a:t>11/03/2019</a:t>
             </a:fld>
             <a:endParaRPr lang="en-GB"/>
           </a:p>
@@ -1990,7 +1995,7 @@
           <a:p>
             <a:fld id="{26496270-3B2A-4858-B8EB-16555E555E46}" type="datetimeFigureOut">
               <a:rPr lang="en-GB" smtClean="0"/>
-              <a:t>04/03/2019</a:t>
+              <a:t>11/03/2019</a:t>
             </a:fld>
             <a:endParaRPr lang="en-GB"/>
           </a:p>
@@ -2085,7 +2090,7 @@
           <a:p>
             <a:fld id="{26496270-3B2A-4858-B8EB-16555E555E46}" type="datetimeFigureOut">
               <a:rPr lang="en-GB" smtClean="0"/>
-              <a:t>04/03/2019</a:t>
+              <a:t>11/03/2019</a:t>
             </a:fld>
             <a:endParaRPr lang="en-GB"/>
           </a:p>
@@ -2375,7 +2380,7 @@
           <a:p>
             <a:fld id="{26496270-3B2A-4858-B8EB-16555E555E46}" type="datetimeFigureOut">
               <a:rPr lang="en-GB" smtClean="0"/>
-              <a:t>04/03/2019</a:t>
+              <a:t>11/03/2019</a:t>
             </a:fld>
             <a:endParaRPr lang="en-GB"/>
           </a:p>
@@ -2647,7 +2652,7 @@
           <a:p>
             <a:fld id="{26496270-3B2A-4858-B8EB-16555E555E46}" type="datetimeFigureOut">
               <a:rPr lang="en-GB" smtClean="0"/>
-              <a:t>04/03/2019</a:t>
+              <a:t>11/03/2019</a:t>
             </a:fld>
             <a:endParaRPr lang="en-GB"/>
           </a:p>
@@ -2900,7 +2905,7 @@
           <a:p>
             <a:fld id="{26496270-3B2A-4858-B8EB-16555E555E46}" type="datetimeFigureOut">
               <a:rPr lang="en-GB" smtClean="0"/>
-              <a:t>04/03/2019</a:t>
+              <a:t>11/03/2019</a:t>
             </a:fld>
             <a:endParaRPr lang="en-GB"/>
           </a:p>
@@ -3369,7 +3374,7 @@
         </p:nvSpPr>
         <p:spPr>
           <a:xfrm>
-            <a:off x="1775520" y="2204864"/>
+            <a:off x="1769070" y="1966260"/>
             <a:ext cx="1872208" cy="864096"/>
           </a:xfrm>
           <a:prstGeom prst="rect">
@@ -3399,7 +3404,6 @@
               <a:rPr lang="en-GB" dirty="0"/>
               <a:t>Movie</a:t>
             </a:r>
-            <a:endParaRPr lang="en-GB" dirty="0"/>
           </a:p>
         </p:txBody>
       </p:sp>
@@ -3411,7 +3415,7 @@
         </p:nvSpPr>
         <p:spPr>
           <a:xfrm>
-            <a:off x="8184232" y="4653136"/>
+            <a:off x="8591555" y="4594219"/>
             <a:ext cx="1872208" cy="864096"/>
           </a:xfrm>
           <a:prstGeom prst="rect">
@@ -3441,7 +3445,6 @@
               <a:rPr lang="en-GB" dirty="0"/>
               <a:t>User</a:t>
             </a:r>
-            <a:endParaRPr lang="en-GB" dirty="0"/>
           </a:p>
         </p:txBody>
       </p:sp>
@@ -3453,7 +3456,7 @@
         </p:nvSpPr>
         <p:spPr>
           <a:xfrm>
-            <a:off x="8328248" y="2204864"/>
+            <a:off x="8510433" y="1992540"/>
             <a:ext cx="1872208" cy="864096"/>
           </a:xfrm>
           <a:prstGeom prst="rect">
@@ -3483,7 +3486,6 @@
               <a:rPr lang="en-GB" dirty="0"/>
               <a:t>Actor</a:t>
             </a:r>
-            <a:endParaRPr lang="en-GB" dirty="0"/>
           </a:p>
         </p:txBody>
       </p:sp>
@@ -3537,7 +3539,7 @@
         </p:nvSpPr>
         <p:spPr>
           <a:xfrm>
-            <a:off x="1775520" y="4509120"/>
+            <a:off x="1766437" y="4622548"/>
             <a:ext cx="1872208" cy="864096"/>
           </a:xfrm>
           <a:prstGeom prst="rect">
@@ -3567,7 +3569,6 @@
               <a:rPr lang="en-GB" dirty="0"/>
               <a:t>Director</a:t>
             </a:r>
-            <a:endParaRPr lang="en-GB" dirty="0"/>
           </a:p>
         </p:txBody>
       </p:sp>
@@ -3609,7 +3610,6 @@
               <a:rPr lang="en-GB" dirty="0"/>
               <a:t>Review</a:t>
             </a:r>
-            <a:endParaRPr lang="en-GB" dirty="0"/>
           </a:p>
         </p:txBody>
       </p:sp>
@@ -3621,7 +3621,7 @@
         </p:nvSpPr>
         <p:spPr>
           <a:xfrm>
-            <a:off x="4943872" y="2204864"/>
+            <a:off x="4999433" y="1988306"/>
             <a:ext cx="1872208" cy="864096"/>
           </a:xfrm>
           <a:prstGeom prst="rect">
@@ -3666,8 +3666,8 @@
         </p:nvCxnSpPr>
         <p:spPr>
           <a:xfrm>
-            <a:off x="3647728" y="2636912"/>
-            <a:ext cx="1296144" cy="0"/>
+            <a:off x="3641278" y="2398308"/>
+            <a:ext cx="1358155" cy="22046"/>
           </a:xfrm>
           <a:prstGeom prst="straightConnector1">
             <a:avLst/>
@@ -3704,9 +3704,9 @@
           <p:nvPr/>
         </p:nvCxnSpPr>
         <p:spPr>
-          <a:xfrm flipH="1">
-            <a:off x="6816080" y="2636912"/>
-            <a:ext cx="1512168" cy="0"/>
+          <a:xfrm flipH="1" flipV="1">
+            <a:off x="6871641" y="2420354"/>
+            <a:ext cx="1638792" cy="4234"/>
           </a:xfrm>
           <a:prstGeom prst="straightConnector1">
             <a:avLst/>
@@ -3744,8 +3744,8 @@
         </p:nvCxnSpPr>
         <p:spPr>
           <a:xfrm flipV="1">
-            <a:off x="2711624" y="1268760"/>
-            <a:ext cx="0" cy="936104"/>
+            <a:off x="2705174" y="1268760"/>
+            <a:ext cx="6450" cy="697500"/>
           </a:xfrm>
           <a:prstGeom prst="straightConnector1">
             <a:avLst/>
@@ -3777,14 +3777,13 @@
           <p:cNvPr id="23" name="Straight Arrow Connector 22"/>
           <p:cNvCxnSpPr>
             <a:stCxn id="5" idx="1"/>
-            <a:endCxn id="9" idx="3"/>
           </p:cNvCxnSpPr>
           <p:nvPr/>
         </p:nvCxnSpPr>
         <p:spPr>
           <a:xfrm flipH="1">
-            <a:off x="6960096" y="5085184"/>
-            <a:ext cx="1224136" cy="0"/>
+            <a:off x="6960096" y="5026267"/>
+            <a:ext cx="1631459" cy="0"/>
           </a:xfrm>
           <a:prstGeom prst="straightConnector1">
             <a:avLst/>
@@ -3837,7 +3836,6 @@
               <a:rPr lang="en-GB" dirty="0"/>
               <a:t>M</a:t>
             </a:r>
-            <a:endParaRPr lang="en-GB" dirty="0"/>
           </a:p>
         </p:txBody>
       </p:sp>
@@ -3867,7 +3865,6 @@
               <a:rPr lang="en-GB" dirty="0"/>
               <a:t>1</a:t>
             </a:r>
-            <a:endParaRPr lang="en-GB" dirty="0"/>
           </a:p>
         </p:txBody>
       </p:sp>
@@ -3879,7 +3876,7 @@
         </p:nvSpPr>
         <p:spPr>
           <a:xfrm>
-            <a:off x="2351584" y="4139788"/>
+            <a:off x="2351584" y="4235191"/>
             <a:ext cx="360040" cy="369332"/>
           </a:xfrm>
           <a:prstGeom prst="rect">
@@ -3897,7 +3894,6 @@
               <a:rPr lang="en-GB" dirty="0"/>
               <a:t>1</a:t>
             </a:r>
-            <a:endParaRPr lang="en-GB" dirty="0"/>
           </a:p>
         </p:txBody>
       </p:sp>
@@ -3909,7 +3905,7 @@
         </p:nvSpPr>
         <p:spPr>
           <a:xfrm>
-            <a:off x="4655840" y="2267580"/>
+            <a:off x="4647144" y="2092206"/>
             <a:ext cx="360040" cy="369332"/>
           </a:xfrm>
           <a:prstGeom prst="rect">
@@ -3927,7 +3923,6 @@
               <a:rPr lang="en-GB" dirty="0"/>
               <a:t>M</a:t>
             </a:r>
-            <a:endParaRPr lang="en-GB" dirty="0"/>
           </a:p>
         </p:txBody>
       </p:sp>
@@ -3939,7 +3934,7 @@
         </p:nvSpPr>
         <p:spPr>
           <a:xfrm>
-            <a:off x="6816080" y="2204864"/>
+            <a:off x="6850098" y="2080046"/>
             <a:ext cx="360040" cy="369332"/>
           </a:xfrm>
           <a:prstGeom prst="rect">
@@ -3957,7 +3952,6 @@
               <a:rPr lang="en-GB" dirty="0"/>
               <a:t>M</a:t>
             </a:r>
-            <a:endParaRPr lang="en-GB" dirty="0"/>
           </a:p>
         </p:txBody>
       </p:sp>
@@ -3969,7 +3963,7 @@
         </p:nvSpPr>
         <p:spPr>
           <a:xfrm>
-            <a:off x="2351584" y="3068960"/>
+            <a:off x="2342501" y="2794306"/>
             <a:ext cx="360040" cy="369332"/>
           </a:xfrm>
           <a:prstGeom prst="rect">
@@ -3987,7 +3981,6 @@
               <a:rPr lang="en-GB" dirty="0"/>
               <a:t>M</a:t>
             </a:r>
-            <a:endParaRPr lang="en-GB" dirty="0"/>
           </a:p>
         </p:txBody>
       </p:sp>
@@ -3999,7 +3992,7 @@
         </p:nvSpPr>
         <p:spPr>
           <a:xfrm>
-            <a:off x="7824192" y="4725144"/>
+            <a:off x="8239196" y="4690485"/>
             <a:ext cx="360040" cy="369332"/>
           </a:xfrm>
           <a:prstGeom prst="rect">
@@ -4017,7 +4010,6 @@
               <a:rPr lang="en-GB" dirty="0"/>
               <a:t>1</a:t>
             </a:r>
-            <a:endParaRPr lang="en-GB" dirty="0"/>
           </a:p>
         </p:txBody>
       </p:sp>
@@ -4029,7 +4021,7 @@
         </p:nvSpPr>
         <p:spPr>
           <a:xfrm>
-            <a:off x="7968208" y="2276872"/>
+            <a:off x="8139622" y="2092206"/>
             <a:ext cx="360040" cy="369332"/>
           </a:xfrm>
           <a:prstGeom prst="rect">
@@ -4047,7 +4039,6 @@
               <a:rPr lang="en-GB" dirty="0"/>
               <a:t>1</a:t>
             </a:r>
-            <a:endParaRPr lang="en-GB" dirty="0"/>
           </a:p>
         </p:txBody>
       </p:sp>
@@ -4059,7 +4050,7 @@
         </p:nvSpPr>
         <p:spPr>
           <a:xfrm>
-            <a:off x="3647728" y="2204864"/>
+            <a:off x="3654347" y="2080046"/>
             <a:ext cx="360040" cy="369332"/>
           </a:xfrm>
           <a:prstGeom prst="rect">
@@ -4077,7 +4068,6 @@
               <a:rPr lang="en-GB" dirty="0"/>
               <a:t>1</a:t>
             </a:r>
-            <a:endParaRPr lang="en-GB" dirty="0"/>
           </a:p>
         </p:txBody>
       </p:sp>
@@ -4089,7 +4079,7 @@
         </p:nvSpPr>
         <p:spPr>
           <a:xfrm>
-            <a:off x="2963652" y="2989117"/>
+            <a:off x="3090375" y="2704385"/>
             <a:ext cx="360040" cy="369332"/>
           </a:xfrm>
           <a:prstGeom prst="rect">
@@ -4107,7 +4097,6 @@
               <a:rPr lang="en-GB" dirty="0"/>
               <a:t>1</a:t>
             </a:r>
-            <a:endParaRPr lang="en-GB" dirty="0"/>
           </a:p>
         </p:txBody>
       </p:sp>
@@ -4119,7 +4108,7 @@
         </p:nvSpPr>
         <p:spPr>
           <a:xfrm>
-            <a:off x="6888088" y="4725144"/>
+            <a:off x="6905257" y="4683700"/>
             <a:ext cx="360040" cy="369332"/>
           </a:xfrm>
           <a:prstGeom prst="rect">
@@ -4137,7 +4126,6 @@
               <a:rPr lang="en-GB" dirty="0"/>
               <a:t>M</a:t>
             </a:r>
-            <a:endParaRPr lang="en-GB" dirty="0"/>
           </a:p>
         </p:txBody>
       </p:sp>
@@ -4149,7 +4137,7 @@
         </p:nvSpPr>
         <p:spPr>
           <a:xfrm>
-            <a:off x="4727848" y="4509120"/>
+            <a:off x="4751692" y="4427962"/>
             <a:ext cx="360040" cy="369332"/>
           </a:xfrm>
           <a:prstGeom prst="rect">
@@ -4167,7 +4155,6 @@
               <a:rPr lang="en-GB" dirty="0"/>
               <a:t>M</a:t>
             </a:r>
-            <a:endParaRPr lang="en-GB" dirty="0"/>
           </a:p>
         </p:txBody>
       </p:sp>
@@ -4179,7 +4166,7 @@
         </p:nvSpPr>
         <p:spPr>
           <a:xfrm>
-            <a:off x="4853218" y="476672"/>
+            <a:off x="5014214" y="415430"/>
             <a:ext cx="1872208" cy="864096"/>
           </a:xfrm>
           <a:prstGeom prst="rect">
@@ -4209,20 +4196,22 @@
               <a:rPr lang="en-GB" dirty="0"/>
               <a:t>Genre</a:t>
             </a:r>
-            <a:endParaRPr lang="en-GB" dirty="0"/>
           </a:p>
         </p:txBody>
       </p:sp>
       <p:cxnSp>
         <p:nvCxnSpPr>
           <p:cNvPr id="43" name="Straight Arrow Connector 42"/>
-          <p:cNvCxnSpPr/>
+          <p:cNvCxnSpPr>
+            <a:stCxn id="7" idx="3"/>
+            <a:endCxn id="28" idx="1"/>
+          </p:cNvCxnSpPr>
           <p:nvPr/>
         </p:nvCxnSpPr>
         <p:spPr>
           <a:xfrm>
             <a:off x="3647728" y="836712"/>
-            <a:ext cx="1205490" cy="0"/>
+            <a:ext cx="1366486" cy="10766"/>
           </a:xfrm>
           <a:prstGeom prst="straightConnector1">
             <a:avLst/>
@@ -4275,7 +4264,6 @@
               <a:rPr lang="en-GB" dirty="0"/>
               <a:t>M</a:t>
             </a:r>
-            <a:endParaRPr lang="en-GB" dirty="0"/>
           </a:p>
         </p:txBody>
       </p:sp>
@@ -4287,7 +4275,7 @@
         </p:nvSpPr>
         <p:spPr>
           <a:xfrm>
-            <a:off x="4513095" y="467380"/>
+            <a:off x="4654174" y="415430"/>
             <a:ext cx="360040" cy="369332"/>
           </a:xfrm>
           <a:prstGeom prst="rect">
@@ -4305,7 +4293,6 @@
               <a:rPr lang="en-GB" dirty="0"/>
               <a:t>1</a:t>
             </a:r>
-            <a:endParaRPr lang="en-GB" dirty="0"/>
           </a:p>
         </p:txBody>
       </p:sp>
@@ -4367,8 +4354,8 @@
         </p:nvCxnSpPr>
         <p:spPr>
           <a:xfrm flipH="1" flipV="1">
-            <a:off x="3150524" y="3068960"/>
-            <a:ext cx="1937364" cy="2016224"/>
+            <a:off x="3317255" y="2848381"/>
+            <a:ext cx="1770633" cy="2236803"/>
           </a:xfrm>
           <a:prstGeom prst="straightConnector1">
             <a:avLst/>
@@ -4406,8 +4393,8 @@
         </p:nvCxnSpPr>
         <p:spPr>
           <a:xfrm flipV="1">
-            <a:off x="2711624" y="3068960"/>
-            <a:ext cx="0" cy="1440160"/>
+            <a:off x="2702541" y="2830356"/>
+            <a:ext cx="2633" cy="1792192"/>
           </a:xfrm>
           <a:prstGeom prst="straightConnector1">
             <a:avLst/>
@@ -4434,6 +4421,236 @@
           </a:fontRef>
         </p:style>
       </p:cxnSp>
+      <p:sp>
+        <p:nvSpPr>
+          <p:cNvPr id="36" name="Rectangle 35"/>
+          <p:cNvSpPr/>
+          <p:nvPr/>
+        </p:nvSpPr>
+        <p:spPr>
+          <a:xfrm>
+            <a:off x="5014214" y="3358556"/>
+            <a:ext cx="1872208" cy="864096"/>
+          </a:xfrm>
+          <a:prstGeom prst="rect">
+            <a:avLst/>
+          </a:prstGeom>
+        </p:spPr>
+        <p:style>
+          <a:lnRef idx="2">
+            <a:schemeClr val="accent6"/>
+          </a:lnRef>
+          <a:fillRef idx="1">
+            <a:schemeClr val="lt1"/>
+          </a:fillRef>
+          <a:effectRef idx="0">
+            <a:schemeClr val="accent6"/>
+          </a:effectRef>
+          <a:fontRef idx="minor">
+            <a:schemeClr val="dk1"/>
+          </a:fontRef>
+        </p:style>
+        <p:txBody>
+          <a:bodyPr rtlCol="0" anchor="ctr"/>
+          <a:lstStyle/>
+          <a:p>
+            <a:pPr algn="ctr"/>
+            <a:r>
+              <a:rPr lang="en-GB" dirty="0" err="1" smtClean="0"/>
+              <a:t>MovieRating</a:t>
+            </a:r>
+            <a:endParaRPr lang="en-GB" dirty="0"/>
+          </a:p>
+        </p:txBody>
+      </p:sp>
+      <p:cxnSp>
+        <p:nvCxnSpPr>
+          <p:cNvPr id="45" name="Straight Arrow Connector 44"/>
+          <p:cNvCxnSpPr/>
+          <p:nvPr/>
+        </p:nvCxnSpPr>
+        <p:spPr>
+          <a:xfrm flipH="1" flipV="1">
+            <a:off x="6886423" y="3903218"/>
+            <a:ext cx="1703038" cy="719330"/>
+          </a:xfrm>
+          <a:prstGeom prst="straightConnector1">
+            <a:avLst/>
+          </a:prstGeom>
+          <a:ln w="28575">
+            <a:solidFill>
+              <a:schemeClr val="tx1"/>
+            </a:solidFill>
+            <a:tailEnd type="arrow"/>
+          </a:ln>
+        </p:spPr>
+        <p:style>
+          <a:lnRef idx="1">
+            <a:schemeClr val="accent1"/>
+          </a:lnRef>
+          <a:fillRef idx="0">
+            <a:schemeClr val="accent1"/>
+          </a:fillRef>
+          <a:effectRef idx="0">
+            <a:schemeClr val="accent1"/>
+          </a:effectRef>
+          <a:fontRef idx="minor">
+            <a:schemeClr val="tx1"/>
+          </a:fontRef>
+        </p:style>
+      </p:cxnSp>
+      <p:sp>
+        <p:nvSpPr>
+          <p:cNvPr id="47" name="TextBox 46"/>
+          <p:cNvSpPr txBox="1"/>
+          <p:nvPr/>
+        </p:nvSpPr>
+        <p:spPr>
+          <a:xfrm>
+            <a:off x="8181733" y="4159305"/>
+            <a:ext cx="360040" cy="369332"/>
+          </a:xfrm>
+          <a:prstGeom prst="rect">
+            <a:avLst/>
+          </a:prstGeom>
+          <a:noFill/>
+        </p:spPr>
+        <p:txBody>
+          <a:bodyPr wrap="square" rtlCol="0">
+            <a:spAutoFit/>
+          </a:bodyPr>
+          <a:lstStyle/>
+          <a:p>
+            <a:r>
+              <a:rPr lang="en-GB" dirty="0"/>
+              <a:t>1</a:t>
+            </a:r>
+          </a:p>
+        </p:txBody>
+      </p:sp>
+      <p:sp>
+        <p:nvSpPr>
+          <p:cNvPr id="48" name="TextBox 47"/>
+          <p:cNvSpPr txBox="1"/>
+          <p:nvPr/>
+        </p:nvSpPr>
+        <p:spPr>
+          <a:xfrm>
+            <a:off x="6846693" y="3598094"/>
+            <a:ext cx="360040" cy="369332"/>
+          </a:xfrm>
+          <a:prstGeom prst="rect">
+            <a:avLst/>
+          </a:prstGeom>
+          <a:noFill/>
+        </p:spPr>
+        <p:txBody>
+          <a:bodyPr wrap="square" rtlCol="0">
+            <a:spAutoFit/>
+          </a:bodyPr>
+          <a:lstStyle/>
+          <a:p>
+            <a:r>
+              <a:rPr lang="en-GB" dirty="0"/>
+              <a:t>M</a:t>
+            </a:r>
+          </a:p>
+        </p:txBody>
+      </p:sp>
+      <p:cxnSp>
+        <p:nvCxnSpPr>
+          <p:cNvPr id="49" name="Straight Arrow Connector 48"/>
+          <p:cNvCxnSpPr/>
+          <p:nvPr/>
+        </p:nvCxnSpPr>
+        <p:spPr>
+          <a:xfrm flipH="1" flipV="1">
+            <a:off x="3647728" y="2700477"/>
+            <a:ext cx="1366487" cy="737815"/>
+          </a:xfrm>
+          <a:prstGeom prst="straightConnector1">
+            <a:avLst/>
+          </a:prstGeom>
+          <a:ln w="28575">
+            <a:solidFill>
+              <a:schemeClr val="tx1"/>
+            </a:solidFill>
+            <a:tailEnd type="arrow"/>
+          </a:ln>
+        </p:spPr>
+        <p:style>
+          <a:lnRef idx="1">
+            <a:schemeClr val="accent1"/>
+          </a:lnRef>
+          <a:fillRef idx="0">
+            <a:schemeClr val="accent1"/>
+          </a:fillRef>
+          <a:effectRef idx="0">
+            <a:schemeClr val="accent1"/>
+          </a:effectRef>
+          <a:fontRef idx="minor">
+            <a:schemeClr val="tx1"/>
+          </a:fontRef>
+        </p:style>
+      </p:cxnSp>
+      <p:sp>
+        <p:nvSpPr>
+          <p:cNvPr id="50" name="TextBox 49"/>
+          <p:cNvSpPr txBox="1"/>
+          <p:nvPr/>
+        </p:nvSpPr>
+        <p:spPr>
+          <a:xfrm>
+            <a:off x="3700656" y="2474684"/>
+            <a:ext cx="360040" cy="369332"/>
+          </a:xfrm>
+          <a:prstGeom prst="rect">
+            <a:avLst/>
+          </a:prstGeom>
+          <a:noFill/>
+        </p:spPr>
+        <p:txBody>
+          <a:bodyPr wrap="square" rtlCol="0">
+            <a:spAutoFit/>
+          </a:bodyPr>
+          <a:lstStyle/>
+          <a:p>
+            <a:r>
+              <a:rPr lang="en-GB" dirty="0"/>
+              <a:t>1</a:t>
+            </a:r>
+          </a:p>
+        </p:txBody>
+      </p:sp>
+      <p:sp>
+        <p:nvSpPr>
+          <p:cNvPr id="51" name="TextBox 50"/>
+          <p:cNvSpPr txBox="1"/>
+          <p:nvPr/>
+        </p:nvSpPr>
+        <p:spPr>
+          <a:xfrm>
+            <a:off x="4725754" y="3335534"/>
+            <a:ext cx="360040" cy="369332"/>
+          </a:xfrm>
+          <a:prstGeom prst="rect">
+            <a:avLst/>
+          </a:prstGeom>
+          <a:noFill/>
+        </p:spPr>
+        <p:txBody>
+          <a:bodyPr wrap="square" rtlCol="0">
+            <a:spAutoFit/>
+          </a:bodyPr>
+          <a:lstStyle/>
+          <a:p>
+            <a:r>
+              <a:rPr lang="en-GB" dirty="0"/>
+              <a:t>1</a:t>
+            </a:r>
+          </a:p>
+        </p:txBody>
+      </p:sp>
     </p:spTree>
     <p:extLst>
       <p:ext uri="{BB962C8B-B14F-4D97-AF65-F5344CB8AC3E}">

</xml_diff>